<commit_message>
Added gamma matrix and probability pj array based on Gunnar code
</commit_message>
<xml_diff>
--- a/Data/Open_model_experiments.pptx
+++ b/Data/Open_model_experiments.pptx
@@ -199,7 +199,7 @@
           <a:p>
             <a:fld id="{2028B780-C387-C74B-9440-FE50BBBC215F}" type="datetimeFigureOut">
               <a:rPr lang="en-US" smtClean="0"/>
-              <a:t>3/25/23</a:t>
+              <a:t>3/26/23</a:t>
             </a:fld>
             <a:endParaRPr lang="en-US"/>
           </a:p>
@@ -721,7 +721,7 @@
           <a:p>
             <a:fld id="{8546C1E8-2744-C940-A9B9-60FBA6D9E815}" type="datetimeFigureOut">
               <a:rPr lang="en-US" smtClean="0"/>
-              <a:t>3/25/23</a:t>
+              <a:t>3/26/23</a:t>
             </a:fld>
             <a:endParaRPr lang="en-US"/>
           </a:p>
@@ -921,7 +921,7 @@
           <a:p>
             <a:fld id="{8546C1E8-2744-C940-A9B9-60FBA6D9E815}" type="datetimeFigureOut">
               <a:rPr lang="en-US" smtClean="0"/>
-              <a:t>3/25/23</a:t>
+              <a:t>3/26/23</a:t>
             </a:fld>
             <a:endParaRPr lang="en-US"/>
           </a:p>
@@ -1131,7 +1131,7 @@
           <a:p>
             <a:fld id="{8546C1E8-2744-C940-A9B9-60FBA6D9E815}" type="datetimeFigureOut">
               <a:rPr lang="en-US" smtClean="0"/>
-              <a:t>3/25/23</a:t>
+              <a:t>3/26/23</a:t>
             </a:fld>
             <a:endParaRPr lang="en-US"/>
           </a:p>
@@ -1331,7 +1331,7 @@
           <a:p>
             <a:fld id="{8546C1E8-2744-C940-A9B9-60FBA6D9E815}" type="datetimeFigureOut">
               <a:rPr lang="en-US" smtClean="0"/>
-              <a:t>3/25/23</a:t>
+              <a:t>3/26/23</a:t>
             </a:fld>
             <a:endParaRPr lang="en-US"/>
           </a:p>
@@ -1607,7 +1607,7 @@
           <a:p>
             <a:fld id="{8546C1E8-2744-C940-A9B9-60FBA6D9E815}" type="datetimeFigureOut">
               <a:rPr lang="en-US" smtClean="0"/>
-              <a:t>3/25/23</a:t>
+              <a:t>3/26/23</a:t>
             </a:fld>
             <a:endParaRPr lang="en-US"/>
           </a:p>
@@ -1875,7 +1875,7 @@
           <a:p>
             <a:fld id="{8546C1E8-2744-C940-A9B9-60FBA6D9E815}" type="datetimeFigureOut">
               <a:rPr lang="en-US" smtClean="0"/>
-              <a:t>3/25/23</a:t>
+              <a:t>3/26/23</a:t>
             </a:fld>
             <a:endParaRPr lang="en-US"/>
           </a:p>
@@ -2290,7 +2290,7 @@
           <a:p>
             <a:fld id="{8546C1E8-2744-C940-A9B9-60FBA6D9E815}" type="datetimeFigureOut">
               <a:rPr lang="en-US" smtClean="0"/>
-              <a:t>3/25/23</a:t>
+              <a:t>3/26/23</a:t>
             </a:fld>
             <a:endParaRPr lang="en-US"/>
           </a:p>
@@ -2432,7 +2432,7 @@
           <a:p>
             <a:fld id="{8546C1E8-2744-C940-A9B9-60FBA6D9E815}" type="datetimeFigureOut">
               <a:rPr lang="en-US" smtClean="0"/>
-              <a:t>3/25/23</a:t>
+              <a:t>3/26/23</a:t>
             </a:fld>
             <a:endParaRPr lang="en-US"/>
           </a:p>
@@ -2545,7 +2545,7 @@
           <a:p>
             <a:fld id="{8546C1E8-2744-C940-A9B9-60FBA6D9E815}" type="datetimeFigureOut">
               <a:rPr lang="en-US" smtClean="0"/>
-              <a:t>3/25/23</a:t>
+              <a:t>3/26/23</a:t>
             </a:fld>
             <a:endParaRPr lang="en-US"/>
           </a:p>
@@ -2858,7 +2858,7 @@
           <a:p>
             <a:fld id="{8546C1E8-2744-C940-A9B9-60FBA6D9E815}" type="datetimeFigureOut">
               <a:rPr lang="en-US" smtClean="0"/>
-              <a:t>3/25/23</a:t>
+              <a:t>3/26/23</a:t>
             </a:fld>
             <a:endParaRPr lang="en-US"/>
           </a:p>
@@ -3147,7 +3147,7 @@
           <a:p>
             <a:fld id="{8546C1E8-2744-C940-A9B9-60FBA6D9E815}" type="datetimeFigureOut">
               <a:rPr lang="en-US" smtClean="0"/>
-              <a:t>3/25/23</a:t>
+              <a:t>3/26/23</a:t>
             </a:fld>
             <a:endParaRPr lang="en-US"/>
           </a:p>
@@ -3390,7 +3390,7 @@
           <a:p>
             <a:fld id="{8546C1E8-2744-C940-A9B9-60FBA6D9E815}" type="datetimeFigureOut">
               <a:rPr lang="en-US" smtClean="0"/>
-              <a:t>3/25/23</a:t>
+              <a:t>3/26/23</a:t>
             </a:fld>
             <a:endParaRPr lang="en-US"/>
           </a:p>
@@ -7105,7 +7105,7 @@
         </p:blipFill>
         <p:spPr>
           <a:xfrm>
-            <a:off x="15015" y="0"/>
+            <a:off x="624615" y="731520"/>
             <a:ext cx="7772400" cy="4382770"/>
           </a:xfrm>
           <a:prstGeom prst="rect">

</xml_diff>

<commit_message>
added comments and QuTiP links
</commit_message>
<xml_diff>
--- a/Data/Open_model_experiments.pptx
+++ b/Data/Open_model_experiments.pptx
@@ -7615,12 +7615,31 @@
                               </m:sSub>
                             </m:e>
                             <m:e>
-                              <m:r>
-                                <a:rPr lang="en-US" i="1" smtClean="0">
-                                  <a:latin typeface="Cambria Math" panose="02040503050406030204" pitchFamily="18" charset="0"/>
-                                </a:rPr>
-                                <m:t>⋮</m:t>
-                              </m:r>
+                              <m:sSub>
+                                <m:sSubPr>
+                                  <m:ctrlPr>
+                                    <a:rPr lang="en-US" b="0" i="1" smtClean="0">
+                                      <a:latin typeface="Cambria Math" panose="02040503050406030204" pitchFamily="18" charset="0"/>
+                                    </a:rPr>
+                                  </m:ctrlPr>
+                                </m:sSubPr>
+                                <m:e>
+                                  <m:r>
+                                    <a:rPr lang="en-US" b="0" i="1" smtClean="0">
+                                      <a:latin typeface="Cambria Math" panose="02040503050406030204" pitchFamily="18" charset="0"/>
+                                    </a:rPr>
+                                    <m:t>𝜌</m:t>
+                                  </m:r>
+                                </m:e>
+                                <m:sub>
+                                  <m:r>
+                                    <a:rPr lang="en-US" b="0" i="1" smtClean="0">
+                                      <a:latin typeface="Cambria Math" panose="02040503050406030204" pitchFamily="18" charset="0"/>
+                                    </a:rPr>
+                                    <m:t>01</m:t>
+                                  </m:r>
+                                </m:sub>
+                              </m:sSub>
                             </m:e>
                             <m:e>
                               <m:sSub>
@@ -7648,6 +7667,64 @@
                                   </m:r>
                                 </m:sub>
                               </m:sSub>
+                            </m:e>
+                          </m:eqArr>
+                        </m:e>
+                      </m:d>
+                      <m:r>
+                        <a:rPr lang="en-US" b="0" i="1" smtClean="0">
+                          <a:latin typeface="Cambria Math" panose="02040503050406030204" pitchFamily="18" charset="0"/>
+                        </a:rPr>
+                        <m:t>=</m:t>
+                      </m:r>
+                      <m:d>
+                        <m:dPr>
+                          <m:ctrlPr>
+                            <a:rPr lang="en-US" b="0" i="1" smtClean="0">
+                              <a:latin typeface="Cambria Math" panose="02040503050406030204" pitchFamily="18" charset="0"/>
+                            </a:rPr>
+                          </m:ctrlPr>
+                        </m:dPr>
+                        <m:e>
+                          <m:eqArr>
+                            <m:eqArrPr>
+                              <m:ctrlPr>
+                                <a:rPr lang="en-US" b="0" i="1" smtClean="0">
+                                  <a:latin typeface="Cambria Math" panose="02040503050406030204" pitchFamily="18" charset="0"/>
+                                </a:rPr>
+                              </m:ctrlPr>
+                            </m:eqArrPr>
+                            <m:e>
+                              <m:r>
+                                <a:rPr lang="en-US" b="0" i="1" smtClean="0">
+                                  <a:latin typeface="Cambria Math" panose="02040503050406030204" pitchFamily="18" charset="0"/>
+                                </a:rPr>
+                                <m:t>0.25</m:t>
+                              </m:r>
+                            </m:e>
+                            <m:e>
+                              <m:r>
+                                <a:rPr lang="en-US" b="0" i="1" smtClean="0">
+                                  <a:latin typeface="Cambria Math" panose="02040503050406030204" pitchFamily="18" charset="0"/>
+                                </a:rPr>
+                                <m:t>0.25</m:t>
+                              </m:r>
+                            </m:e>
+                            <m:e>
+                              <m:r>
+                                <a:rPr lang="en-US" b="0" i="1" smtClean="0">
+                                  <a:latin typeface="Cambria Math" panose="02040503050406030204" pitchFamily="18" charset="0"/>
+                                </a:rPr>
+                                <m:t>0.25</m:t>
+                              </m:r>
+                            </m:e>
+                            <m:e>
+                              <m:r>
+                                <a:rPr lang="en-US" b="0" i="1" smtClean="0">
+                                  <a:latin typeface="Cambria Math" panose="02040503050406030204" pitchFamily="18" charset="0"/>
+                                </a:rPr>
+                                <m:t>0.75</m:t>
+                              </m:r>
                             </m:e>
                           </m:eqArr>
                         </m:e>

</xml_diff>

<commit_message>
QuTiP examples and debugging main code
</commit_message>
<xml_diff>
--- a/Data/Open_model_experiments.pptx
+++ b/Data/Open_model_experiments.pptx
@@ -5,12 +5,15 @@
     <p:sldMasterId id="2147483648" r:id="rId1"/>
   </p:sldMasterIdLst>
   <p:notesMasterIdLst>
-    <p:notesMasterId r:id="rId5"/>
+    <p:notesMasterId r:id="rId8"/>
   </p:notesMasterIdLst>
   <p:sldIdLst>
     <p:sldId id="256" r:id="rId2"/>
     <p:sldId id="257" r:id="rId3"/>
     <p:sldId id="258" r:id="rId4"/>
+    <p:sldId id="259" r:id="rId5"/>
+    <p:sldId id="260" r:id="rId6"/>
+    <p:sldId id="261" r:id="rId7"/>
   </p:sldIdLst>
   <p:sldSz cx="12192000" cy="6858000"/>
   <p:notesSz cx="6858000" cy="9144000"/>
@@ -199,7 +202,7 @@
           <a:p>
             <a:fld id="{2028B780-C387-C74B-9440-FE50BBBC215F}" type="datetimeFigureOut">
               <a:rPr lang="en-US" smtClean="0"/>
-              <a:t>4/17/23</a:t>
+              <a:t>4/20/23</a:t>
             </a:fld>
             <a:endParaRPr lang="en-US"/>
           </a:p>
@@ -572,6 +575,255 @@
 </p:notes>
 </file>
 
+<file path=ppt/notesSlides/notesSlide2.xml><?xml version="1.0" encoding="utf-8"?>
+<p:notes xmlns:a="http://schemas.openxmlformats.org/drawingml/2006/main" xmlns:r="http://schemas.openxmlformats.org/officeDocument/2006/relationships" xmlns:p="http://schemas.openxmlformats.org/presentationml/2006/main">
+  <p:cSld>
+    <p:spTree>
+      <p:nvGrpSpPr>
+        <p:cNvPr id="1" name=""/>
+        <p:cNvGrpSpPr/>
+        <p:nvPr/>
+      </p:nvGrpSpPr>
+      <p:grpSpPr>
+        <a:xfrm>
+          <a:off x="0" y="0"/>
+          <a:ext cx="0" cy="0"/>
+          <a:chOff x="0" y="0"/>
+          <a:chExt cx="0" cy="0"/>
+        </a:xfrm>
+      </p:grpSpPr>
+      <p:sp>
+        <p:nvSpPr>
+          <p:cNvPr id="2" name="Slide Image Placeholder 1"/>
+          <p:cNvSpPr>
+            <a:spLocks noGrp="1" noRot="1" noChangeAspect="1"/>
+          </p:cNvSpPr>
+          <p:nvPr>
+            <p:ph type="sldImg"/>
+          </p:nvPr>
+        </p:nvSpPr>
+        <p:spPr/>
+      </p:sp>
+      <p:sp>
+        <p:nvSpPr>
+          <p:cNvPr id="3" name="Notes Placeholder 2"/>
+          <p:cNvSpPr>
+            <a:spLocks noGrp="1"/>
+          </p:cNvSpPr>
+          <p:nvPr>
+            <p:ph type="body" idx="1"/>
+          </p:nvPr>
+        </p:nvSpPr>
+        <p:spPr/>
+        <p:txBody>
+          <a:bodyPr/>
+          <a:lstStyle/>
+          <a:p>
+            <a:r>
+              <a:rPr lang="en-US" dirty="0"/>
+              <a:t>Gamma parameter set as 2.0 here (at top of code)</a:t>
+            </a:r>
+          </a:p>
+        </p:txBody>
+      </p:sp>
+      <p:sp>
+        <p:nvSpPr>
+          <p:cNvPr id="4" name="Slide Number Placeholder 3"/>
+          <p:cNvSpPr>
+            <a:spLocks noGrp="1"/>
+          </p:cNvSpPr>
+          <p:nvPr>
+            <p:ph type="sldNum" sz="quarter" idx="5"/>
+          </p:nvPr>
+        </p:nvSpPr>
+        <p:spPr/>
+        <p:txBody>
+          <a:bodyPr/>
+          <a:lstStyle/>
+          <a:p>
+            <a:fld id="{B44ED307-590B-0A4B-A373-2F3C7877A8DA}" type="slidenum">
+              <a:rPr lang="en-US" smtClean="0"/>
+              <a:t>3</a:t>
+            </a:fld>
+            <a:endParaRPr lang="en-US"/>
+          </a:p>
+        </p:txBody>
+      </p:sp>
+    </p:spTree>
+    <p:extLst>
+      <p:ext uri="{BB962C8B-B14F-4D97-AF65-F5344CB8AC3E}">
+        <p14:creationId xmlns:p14="http://schemas.microsoft.com/office/powerpoint/2010/main" val="880023335"/>
+      </p:ext>
+    </p:extLst>
+  </p:cSld>
+  <p:clrMapOvr>
+    <a:masterClrMapping/>
+  </p:clrMapOvr>
+</p:notes>
+</file>
+
+<file path=ppt/notesSlides/notesSlide3.xml><?xml version="1.0" encoding="utf-8"?>
+<p:notes xmlns:a="http://schemas.openxmlformats.org/drawingml/2006/main" xmlns:r="http://schemas.openxmlformats.org/officeDocument/2006/relationships" xmlns:p="http://schemas.openxmlformats.org/presentationml/2006/main">
+  <p:cSld>
+    <p:spTree>
+      <p:nvGrpSpPr>
+        <p:cNvPr id="1" name=""/>
+        <p:cNvGrpSpPr/>
+        <p:nvPr/>
+      </p:nvGrpSpPr>
+      <p:grpSpPr>
+        <a:xfrm>
+          <a:off x="0" y="0"/>
+          <a:ext cx="0" cy="0"/>
+          <a:chOff x="0" y="0"/>
+          <a:chExt cx="0" cy="0"/>
+        </a:xfrm>
+      </p:grpSpPr>
+      <p:sp>
+        <p:nvSpPr>
+          <p:cNvPr id="2" name="Slide Image Placeholder 1"/>
+          <p:cNvSpPr>
+            <a:spLocks noGrp="1" noRot="1" noChangeAspect="1"/>
+          </p:cNvSpPr>
+          <p:nvPr>
+            <p:ph type="sldImg"/>
+          </p:nvPr>
+        </p:nvSpPr>
+        <p:spPr/>
+      </p:sp>
+      <p:sp>
+        <p:nvSpPr>
+          <p:cNvPr id="3" name="Notes Placeholder 2"/>
+          <p:cNvSpPr>
+            <a:spLocks noGrp="1"/>
+          </p:cNvSpPr>
+          <p:nvPr>
+            <p:ph type="body" idx="1"/>
+          </p:nvPr>
+        </p:nvSpPr>
+        <p:spPr/>
+        <p:txBody>
+          <a:bodyPr/>
+          <a:lstStyle/>
+          <a:p>
+            <a:br>
+              <a:rPr lang="en-SG" dirty="0">
+                <a:effectLst/>
+                <a:latin typeface="Helvetica Neue" panose="02000503000000020004" pitchFamily="2" charset="0"/>
+              </a:rPr>
+            </a:br>
+            <a:r>
+              <a:rPr lang="en-SG" dirty="0">
+                <a:effectLst/>
+                <a:latin typeface="Helvetica Neue" panose="02000503000000020004" pitchFamily="2" charset="0"/>
+              </a:rPr>
+              <a:t>20 April</a:t>
+            </a:r>
+          </a:p>
+          <a:p>
+            <a:pPr>
+              <a:buFont typeface="Arial" panose="020B0604020202020204" pitchFamily="34" charset="0"/>
+              <a:buChar char="•"/>
+            </a:pPr>
+            <a:r>
+              <a:rPr lang="en-SG" dirty="0">
+                <a:effectLst/>
+                <a:latin typeface="Helvetica Neue" panose="02000503000000020004" pitchFamily="2" charset="0"/>
+              </a:rPr>
+              <a:t>Try smaller time steps to see if any different. </a:t>
+            </a:r>
+          </a:p>
+          <a:p>
+            <a:pPr>
+              <a:buFont typeface="Arial" panose="020B0604020202020204" pitchFamily="34" charset="0"/>
+              <a:buChar char="•"/>
+            </a:pPr>
+            <a:r>
+              <a:rPr lang="en-SG" dirty="0">
+                <a:effectLst/>
+                <a:latin typeface="Helvetica Neue" panose="02000503000000020004" pitchFamily="2" charset="0"/>
+              </a:rPr>
+              <a:t>Install and run </a:t>
+            </a:r>
+            <a:r>
+              <a:rPr lang="en-SG" dirty="0" err="1">
+                <a:effectLst/>
+                <a:latin typeface="Helvetica Neue" panose="02000503000000020004" pitchFamily="2" charset="0"/>
+              </a:rPr>
+              <a:t>QuTiP</a:t>
+            </a:r>
+            <a:r>
+              <a:rPr lang="en-SG" dirty="0">
+                <a:effectLst/>
+                <a:latin typeface="Helvetica Neue" panose="02000503000000020004" pitchFamily="2" charset="0"/>
+              </a:rPr>
+              <a:t> examples to debug my analytical </a:t>
+            </a:r>
+          </a:p>
+          <a:p>
+            <a:pPr>
+              <a:buFont typeface="Arial" panose="020B0604020202020204" pitchFamily="34" charset="0"/>
+              <a:buChar char="•"/>
+            </a:pPr>
+            <a:r>
+              <a:rPr lang="en-SG" dirty="0">
+                <a:effectLst/>
+                <a:latin typeface="Helvetica Neue" panose="02000503000000020004" pitchFamily="2" charset="0"/>
+              </a:rPr>
+              <a:t>Align values of delta, gamma and initial values</a:t>
+            </a:r>
+          </a:p>
+          <a:p>
+            <a:pPr>
+              <a:buFont typeface="Arial" panose="020B0604020202020204" pitchFamily="34" charset="0"/>
+              <a:buChar char="•"/>
+            </a:pPr>
+            <a:r>
+              <a:rPr lang="en-SG" dirty="0">
+                <a:effectLst/>
+                <a:latin typeface="Helvetica Neue" panose="02000503000000020004" pitchFamily="2" charset="0"/>
+              </a:rPr>
+              <a:t>Use small delta for quantum to match my analytical results</a:t>
+            </a:r>
+          </a:p>
+        </p:txBody>
+      </p:sp>
+      <p:sp>
+        <p:nvSpPr>
+          <p:cNvPr id="4" name="Slide Number Placeholder 3"/>
+          <p:cNvSpPr>
+            <a:spLocks noGrp="1"/>
+          </p:cNvSpPr>
+          <p:nvPr>
+            <p:ph type="sldNum" sz="quarter" idx="5"/>
+          </p:nvPr>
+        </p:nvSpPr>
+        <p:spPr/>
+        <p:txBody>
+          <a:bodyPr/>
+          <a:lstStyle/>
+          <a:p>
+            <a:fld id="{B44ED307-590B-0A4B-A373-2F3C7877A8DA}" type="slidenum">
+              <a:rPr lang="en-US" smtClean="0"/>
+              <a:t>4</a:t>
+            </a:fld>
+            <a:endParaRPr lang="en-US"/>
+          </a:p>
+        </p:txBody>
+      </p:sp>
+    </p:spTree>
+    <p:extLst>
+      <p:ext uri="{BB962C8B-B14F-4D97-AF65-F5344CB8AC3E}">
+        <p14:creationId xmlns:p14="http://schemas.microsoft.com/office/powerpoint/2010/main" val="221862218"/>
+      </p:ext>
+    </p:extLst>
+  </p:cSld>
+  <p:clrMapOvr>
+    <a:masterClrMapping/>
+  </p:clrMapOvr>
+</p:notes>
+</file>
+
 <file path=ppt/slideLayouts/slideLayout1.xml><?xml version="1.0" encoding="utf-8"?>
 <p:sldLayout xmlns:a="http://schemas.openxmlformats.org/drawingml/2006/main" xmlns:r="http://schemas.openxmlformats.org/officeDocument/2006/relationships" xmlns:p="http://schemas.openxmlformats.org/presentationml/2006/main" type="title" preserve="1">
   <p:cSld name="Title Slide">
@@ -721,7 +973,7 @@
           <a:p>
             <a:fld id="{8546C1E8-2744-C940-A9B9-60FBA6D9E815}" type="datetimeFigureOut">
               <a:rPr lang="en-US" smtClean="0"/>
-              <a:t>4/17/23</a:t>
+              <a:t>4/20/23</a:t>
             </a:fld>
             <a:endParaRPr lang="en-US"/>
           </a:p>
@@ -921,7 +1173,7 @@
           <a:p>
             <a:fld id="{8546C1E8-2744-C940-A9B9-60FBA6D9E815}" type="datetimeFigureOut">
               <a:rPr lang="en-US" smtClean="0"/>
-              <a:t>4/17/23</a:t>
+              <a:t>4/20/23</a:t>
             </a:fld>
             <a:endParaRPr lang="en-US"/>
           </a:p>
@@ -1131,7 +1383,7 @@
           <a:p>
             <a:fld id="{8546C1E8-2744-C940-A9B9-60FBA6D9E815}" type="datetimeFigureOut">
               <a:rPr lang="en-US" smtClean="0"/>
-              <a:t>4/17/23</a:t>
+              <a:t>4/20/23</a:t>
             </a:fld>
             <a:endParaRPr lang="en-US"/>
           </a:p>
@@ -1331,7 +1583,7 @@
           <a:p>
             <a:fld id="{8546C1E8-2744-C940-A9B9-60FBA6D9E815}" type="datetimeFigureOut">
               <a:rPr lang="en-US" smtClean="0"/>
-              <a:t>4/17/23</a:t>
+              <a:t>4/20/23</a:t>
             </a:fld>
             <a:endParaRPr lang="en-US"/>
           </a:p>
@@ -1607,7 +1859,7 @@
           <a:p>
             <a:fld id="{8546C1E8-2744-C940-A9B9-60FBA6D9E815}" type="datetimeFigureOut">
               <a:rPr lang="en-US" smtClean="0"/>
-              <a:t>4/17/23</a:t>
+              <a:t>4/20/23</a:t>
             </a:fld>
             <a:endParaRPr lang="en-US"/>
           </a:p>
@@ -1875,7 +2127,7 @@
           <a:p>
             <a:fld id="{8546C1E8-2744-C940-A9B9-60FBA6D9E815}" type="datetimeFigureOut">
               <a:rPr lang="en-US" smtClean="0"/>
-              <a:t>4/17/23</a:t>
+              <a:t>4/20/23</a:t>
             </a:fld>
             <a:endParaRPr lang="en-US"/>
           </a:p>
@@ -2290,7 +2542,7 @@
           <a:p>
             <a:fld id="{8546C1E8-2744-C940-A9B9-60FBA6D9E815}" type="datetimeFigureOut">
               <a:rPr lang="en-US" smtClean="0"/>
-              <a:t>4/17/23</a:t>
+              <a:t>4/20/23</a:t>
             </a:fld>
             <a:endParaRPr lang="en-US"/>
           </a:p>
@@ -2432,7 +2684,7 @@
           <a:p>
             <a:fld id="{8546C1E8-2744-C940-A9B9-60FBA6D9E815}" type="datetimeFigureOut">
               <a:rPr lang="en-US" smtClean="0"/>
-              <a:t>4/17/23</a:t>
+              <a:t>4/20/23</a:t>
             </a:fld>
             <a:endParaRPr lang="en-US"/>
           </a:p>
@@ -2545,7 +2797,7 @@
           <a:p>
             <a:fld id="{8546C1E8-2744-C940-A9B9-60FBA6D9E815}" type="datetimeFigureOut">
               <a:rPr lang="en-US" smtClean="0"/>
-              <a:t>4/17/23</a:t>
+              <a:t>4/20/23</a:t>
             </a:fld>
             <a:endParaRPr lang="en-US"/>
           </a:p>
@@ -2858,7 +3110,7 @@
           <a:p>
             <a:fld id="{8546C1E8-2744-C940-A9B9-60FBA6D9E815}" type="datetimeFigureOut">
               <a:rPr lang="en-US" smtClean="0"/>
-              <a:t>4/17/23</a:t>
+              <a:t>4/20/23</a:t>
             </a:fld>
             <a:endParaRPr lang="en-US"/>
           </a:p>
@@ -3147,7 +3399,7 @@
           <a:p>
             <a:fld id="{8546C1E8-2744-C940-A9B9-60FBA6D9E815}" type="datetimeFigureOut">
               <a:rPr lang="en-US" smtClean="0"/>
-              <a:t>4/17/23</a:t>
+              <a:t>4/20/23</a:t>
             </a:fld>
             <a:endParaRPr lang="en-US"/>
           </a:p>
@@ -3390,7 +3642,7 @@
           <a:p>
             <a:fld id="{8546C1E8-2744-C940-A9B9-60FBA6D9E815}" type="datetimeFigureOut">
               <a:rPr lang="en-US" smtClean="0"/>
-              <a:t>4/17/23</a:t>
+              <a:t>4/20/23</a:t>
             </a:fld>
             <a:endParaRPr lang="en-US"/>
           </a:p>
@@ -7118,7 +7370,7 @@
             <p:nvPr/>
           </p:nvPicPr>
           <p:blipFill>
-            <a:blip r:embed="rId2">
+            <a:blip r:embed="rId3">
               <a:extLst>
                 <a:ext uri="{28A0092B-C50C-407E-A947-70E740481C1C}">
                   <a14:useLocalDpi xmlns:a14="http://schemas.microsoft.com/office/drawing/2010/main" val="0"/>
@@ -7156,53 +7408,6 @@
               <a:extLst>
                 <a:ext uri="{FF2B5EF4-FFF2-40B4-BE49-F238E27FC236}">
                   <a16:creationId xmlns:a16="http://schemas.microsoft.com/office/drawing/2014/main" id="{AFD15F83-EA08-A9E1-76EC-CA8DE0B1F548}"/>
-                </a:ext>
-              </a:extLst>
-            </p:cNvPr>
-            <p:cNvPicPr>
-              <a:picLocks noChangeAspect="1" noChangeArrowheads="1"/>
-            </p:cNvPicPr>
-            <p:nvPr/>
-          </p:nvPicPr>
-          <p:blipFill>
-            <a:blip r:embed="rId3">
-              <a:extLst>
-                <a:ext uri="{28A0092B-C50C-407E-A947-70E740481C1C}">
-                  <a14:useLocalDpi xmlns:a14="http://schemas.microsoft.com/office/drawing/2010/main" val="0"/>
-                </a:ext>
-              </a:extLst>
-            </a:blip>
-            <a:srcRect/>
-            <a:stretch>
-              <a:fillRect/>
-            </a:stretch>
-          </p:blipFill>
-          <p:spPr bwMode="auto">
-            <a:xfrm>
-              <a:off x="3775710" y="339004"/>
-              <a:ext cx="2832354" cy="2272877"/>
-            </a:xfrm>
-            <a:prstGeom prst="rect">
-              <a:avLst/>
-            </a:prstGeom>
-            <a:noFill/>
-            <a:extLst>
-              <a:ext uri="{909E8E84-426E-40DD-AFC4-6F175D3DCCD1}">
-                <a14:hiddenFill xmlns:a14="http://schemas.microsoft.com/office/drawing/2010/main">
-                  <a:solidFill>
-                    <a:srgbClr val="FFFFFF"/>
-                  </a:solidFill>
-                </a14:hiddenFill>
-              </a:ext>
-            </a:extLst>
-          </p:spPr>
-        </p:pic>
-        <p:pic>
-          <p:nvPicPr>
-            <p:cNvPr id="1030" name="Picture 6">
-              <a:extLst>
-                <a:ext uri="{FF2B5EF4-FFF2-40B4-BE49-F238E27FC236}">
-                  <a16:creationId xmlns:a16="http://schemas.microsoft.com/office/drawing/2014/main" id="{68A69E56-4FD4-3D82-0105-D3284250C5F6}"/>
                 </a:ext>
               </a:extLst>
             </p:cNvPr>
@@ -7226,8 +7431,8 @@
           </p:blipFill>
           <p:spPr bwMode="auto">
             <a:xfrm>
-              <a:off x="6871277" y="339004"/>
-              <a:ext cx="2832355" cy="2272877"/>
+              <a:off x="3775710" y="339004"/>
+              <a:ext cx="2832354" cy="2272877"/>
             </a:xfrm>
             <a:prstGeom prst="rect">
               <a:avLst/>
@@ -7246,10 +7451,10 @@
         </p:pic>
         <p:pic>
           <p:nvPicPr>
-            <p:cNvPr id="1032" name="Picture 8">
+            <p:cNvPr id="1030" name="Picture 6">
               <a:extLst>
                 <a:ext uri="{FF2B5EF4-FFF2-40B4-BE49-F238E27FC236}">
-                  <a16:creationId xmlns:a16="http://schemas.microsoft.com/office/drawing/2014/main" id="{B6EE745E-4FBD-F96F-F0F1-DEE5C2DF0AC6}"/>
+                  <a16:creationId xmlns:a16="http://schemas.microsoft.com/office/drawing/2014/main" id="{68A69E56-4FD4-3D82-0105-D3284250C5F6}"/>
                 </a:ext>
               </a:extLst>
             </p:cNvPr>
@@ -7273,8 +7478,8 @@
           </p:blipFill>
           <p:spPr bwMode="auto">
             <a:xfrm>
-              <a:off x="6871277" y="2611881"/>
-              <a:ext cx="2832354" cy="2272877"/>
+              <a:off x="6871277" y="339004"/>
+              <a:ext cx="2832355" cy="2272877"/>
             </a:xfrm>
             <a:prstGeom prst="rect">
               <a:avLst/>
@@ -7293,10 +7498,10 @@
         </p:pic>
         <p:pic>
           <p:nvPicPr>
-            <p:cNvPr id="1034" name="Picture 10">
+            <p:cNvPr id="1032" name="Picture 8">
               <a:extLst>
                 <a:ext uri="{FF2B5EF4-FFF2-40B4-BE49-F238E27FC236}">
-                  <a16:creationId xmlns:a16="http://schemas.microsoft.com/office/drawing/2014/main" id="{774DDAC9-2AE6-C395-B89D-D5CD1D2E4C39}"/>
+                  <a16:creationId xmlns:a16="http://schemas.microsoft.com/office/drawing/2014/main" id="{B6EE745E-4FBD-F96F-F0F1-DEE5C2DF0AC6}"/>
                 </a:ext>
               </a:extLst>
             </p:cNvPr>
@@ -7320,8 +7525,8 @@
           </p:blipFill>
           <p:spPr bwMode="auto">
             <a:xfrm>
-              <a:off x="3775709" y="2611880"/>
-              <a:ext cx="2832356" cy="2272878"/>
+              <a:off x="6871277" y="2611881"/>
+              <a:ext cx="2832354" cy="2272877"/>
             </a:xfrm>
             <a:prstGeom prst="rect">
               <a:avLst/>
@@ -7340,10 +7545,10 @@
         </p:pic>
         <p:pic>
           <p:nvPicPr>
-            <p:cNvPr id="1036" name="Picture 12">
+            <p:cNvPr id="1034" name="Picture 10">
               <a:extLst>
                 <a:ext uri="{FF2B5EF4-FFF2-40B4-BE49-F238E27FC236}">
-                  <a16:creationId xmlns:a16="http://schemas.microsoft.com/office/drawing/2014/main" id="{DDBC8B66-533F-9A5B-EC0E-4EFBF524D6E8}"/>
+                  <a16:creationId xmlns:a16="http://schemas.microsoft.com/office/drawing/2014/main" id="{774DDAC9-2AE6-C395-B89D-D5CD1D2E4C39}"/>
                 </a:ext>
               </a:extLst>
             </p:cNvPr>
@@ -7367,6 +7572,53 @@
           </p:blipFill>
           <p:spPr bwMode="auto">
             <a:xfrm>
+              <a:off x="3775709" y="2611880"/>
+              <a:ext cx="2832356" cy="2272878"/>
+            </a:xfrm>
+            <a:prstGeom prst="rect">
+              <a:avLst/>
+            </a:prstGeom>
+            <a:noFill/>
+            <a:extLst>
+              <a:ext uri="{909E8E84-426E-40DD-AFC4-6F175D3DCCD1}">
+                <a14:hiddenFill xmlns:a14="http://schemas.microsoft.com/office/drawing/2010/main">
+                  <a:solidFill>
+                    <a:srgbClr val="FFFFFF"/>
+                  </a:solidFill>
+                </a14:hiddenFill>
+              </a:ext>
+            </a:extLst>
+          </p:spPr>
+        </p:pic>
+        <p:pic>
+          <p:nvPicPr>
+            <p:cNvPr id="1036" name="Picture 12">
+              <a:extLst>
+                <a:ext uri="{FF2B5EF4-FFF2-40B4-BE49-F238E27FC236}">
+                  <a16:creationId xmlns:a16="http://schemas.microsoft.com/office/drawing/2014/main" id="{DDBC8B66-533F-9A5B-EC0E-4EFBF524D6E8}"/>
+                </a:ext>
+              </a:extLst>
+            </p:cNvPr>
+            <p:cNvPicPr>
+              <a:picLocks noChangeAspect="1" noChangeArrowheads="1"/>
+            </p:cNvPicPr>
+            <p:nvPr/>
+          </p:nvPicPr>
+          <p:blipFill>
+            <a:blip r:embed="rId8">
+              <a:extLst>
+                <a:ext uri="{28A0092B-C50C-407E-A947-70E740481C1C}">
+                  <a14:useLocalDpi xmlns:a14="http://schemas.microsoft.com/office/drawing/2010/main" val="0"/>
+                </a:ext>
+              </a:extLst>
+            </a:blip>
+            <a:srcRect/>
+            <a:stretch>
+              <a:fillRect/>
+            </a:stretch>
+          </p:blipFill>
+          <p:spPr bwMode="auto">
+            <a:xfrm>
               <a:off x="811747" y="2611880"/>
               <a:ext cx="2832356" cy="2272878"/>
             </a:xfrm>
@@ -7386,8 +7638,8 @@
           </p:spPr>
         </p:pic>
       </p:grpSp>
-      <mc:AlternateContent xmlns:mc="http://schemas.openxmlformats.org/markup-compatibility/2006">
-        <mc:Choice xmlns:a14="http://schemas.microsoft.com/office/drawing/2010/main" Requires="a14">
+      <mc:AlternateContent xmlns:mc="http://schemas.openxmlformats.org/markup-compatibility/2006" xmlns:a14="http://schemas.microsoft.com/office/drawing/2010/main">
+        <mc:Choice Requires="a14">
           <p:sp>
             <p:nvSpPr>
               <p:cNvPr id="5" name="TextBox 4">
@@ -7416,6 +7668,7 @@
               </a:bodyPr>
               <a:lstStyle/>
               <a:p>
+                <a:pPr/>
                 <a14:m>
                   <m:oMathPara xmlns:m="http://schemas.openxmlformats.org/officeDocument/2006/math">
                     <m:oMathParaPr>
@@ -7737,7 +7990,7 @@
             </p:txBody>
           </p:sp>
         </mc:Choice>
-        <mc:Fallback>
+        <mc:Fallback xmlns="">
           <p:sp>
             <p:nvSpPr>
               <p:cNvPr id="5" name="TextBox 4">
@@ -7761,7 +8014,7 @@
                 <a:avLst/>
               </a:prstGeom>
               <a:blipFill>
-                <a:blip r:embed="rId8"/>
+                <a:blip r:embed="rId9"/>
                 <a:stretch>
                   <a:fillRect b="-1111"/>
                 </a:stretch>
@@ -7786,6 +8039,828 @@
     <p:extLst>
       <p:ext uri="{BB962C8B-B14F-4D97-AF65-F5344CB8AC3E}">
         <p14:creationId xmlns:p14="http://schemas.microsoft.com/office/powerpoint/2010/main" val="4251598745"/>
+      </p:ext>
+    </p:extLst>
+  </p:cSld>
+  <p:clrMapOvr>
+    <a:masterClrMapping/>
+  </p:clrMapOvr>
+</p:sld>
+</file>
+
+<file path=ppt/slides/slide4.xml><?xml version="1.0" encoding="utf-8"?>
+<p:sld xmlns:a="http://schemas.openxmlformats.org/drawingml/2006/main" xmlns:r="http://schemas.openxmlformats.org/officeDocument/2006/relationships" xmlns:p="http://schemas.openxmlformats.org/presentationml/2006/main">
+  <p:cSld>
+    <p:spTree>
+      <p:nvGrpSpPr>
+        <p:cNvPr id="1" name=""/>
+        <p:cNvGrpSpPr/>
+        <p:nvPr/>
+      </p:nvGrpSpPr>
+      <p:grpSpPr>
+        <a:xfrm>
+          <a:off x="0" y="0"/>
+          <a:ext cx="0" cy="0"/>
+          <a:chOff x="0" y="0"/>
+          <a:chExt cx="0" cy="0"/>
+        </a:xfrm>
+      </p:grpSpPr>
+      <p:pic>
+        <p:nvPicPr>
+          <p:cNvPr id="4" name="Picture 12">
+            <a:extLst>
+              <a:ext uri="{FF2B5EF4-FFF2-40B4-BE49-F238E27FC236}">
+                <a16:creationId xmlns:a16="http://schemas.microsoft.com/office/drawing/2014/main" id="{F9332736-FFE0-CC8D-CCD8-3A5919603298}"/>
+              </a:ext>
+            </a:extLst>
+          </p:cNvPr>
+          <p:cNvPicPr>
+            <a:picLocks noChangeAspect="1" noChangeArrowheads="1"/>
+          </p:cNvPicPr>
+          <p:nvPr/>
+        </p:nvPicPr>
+        <p:blipFill>
+          <a:blip r:embed="rId3">
+            <a:extLst>
+              <a:ext uri="{28A0092B-C50C-407E-A947-70E740481C1C}">
+                <a14:useLocalDpi xmlns:a14="http://schemas.microsoft.com/office/drawing/2010/main" val="0"/>
+              </a:ext>
+            </a:extLst>
+          </a:blip>
+          <a:srcRect/>
+          <a:stretch>
+            <a:fillRect/>
+          </a:stretch>
+        </p:blipFill>
+        <p:spPr bwMode="auto">
+          <a:xfrm>
+            <a:off x="1511916" y="94626"/>
+            <a:ext cx="2844910" cy="2282952"/>
+          </a:xfrm>
+          <a:prstGeom prst="rect">
+            <a:avLst/>
+          </a:prstGeom>
+          <a:noFill/>
+          <a:extLst>
+            <a:ext uri="{909E8E84-426E-40DD-AFC4-6F175D3DCCD1}">
+              <a14:hiddenFill xmlns:a14="http://schemas.microsoft.com/office/drawing/2010/main">
+                <a:solidFill>
+                  <a:srgbClr val="FFFFFF"/>
+                </a:solidFill>
+              </a14:hiddenFill>
+            </a:ext>
+          </a:extLst>
+        </p:spPr>
+      </p:pic>
+      <p:sp>
+        <p:nvSpPr>
+          <p:cNvPr id="5" name="TextBox 4">
+            <a:extLst>
+              <a:ext uri="{FF2B5EF4-FFF2-40B4-BE49-F238E27FC236}">
+                <a16:creationId xmlns:a16="http://schemas.microsoft.com/office/drawing/2014/main" id="{D8807C50-A52C-427F-0D3C-3655F20DFBD7}"/>
+              </a:ext>
+            </a:extLst>
+          </p:cNvPr>
+          <p:cNvSpPr txBox="1"/>
+          <p:nvPr/>
+        </p:nvSpPr>
+        <p:spPr>
+          <a:xfrm>
+            <a:off x="207264" y="774437"/>
+            <a:ext cx="1304652" cy="923330"/>
+          </a:xfrm>
+          <a:prstGeom prst="rect">
+            <a:avLst/>
+          </a:prstGeom>
+          <a:noFill/>
+        </p:spPr>
+        <p:txBody>
+          <a:bodyPr wrap="square" rtlCol="0">
+            <a:spAutoFit/>
+          </a:bodyPr>
+          <a:lstStyle/>
+          <a:p>
+            <a:r>
+              <a:rPr lang="en-US" dirty="0"/>
+              <a:t>Timestep: 1E-6 s (1 microsec)</a:t>
+            </a:r>
+          </a:p>
+        </p:txBody>
+      </p:sp>
+      <p:pic>
+        <p:nvPicPr>
+          <p:cNvPr id="1026" name="Picture 2">
+            <a:extLst>
+              <a:ext uri="{FF2B5EF4-FFF2-40B4-BE49-F238E27FC236}">
+                <a16:creationId xmlns:a16="http://schemas.microsoft.com/office/drawing/2014/main" id="{0B8037BC-E22D-DE41-842E-ABAC85F20059}"/>
+              </a:ext>
+            </a:extLst>
+          </p:cNvPr>
+          <p:cNvPicPr>
+            <a:picLocks noChangeAspect="1" noChangeArrowheads="1"/>
+          </p:cNvPicPr>
+          <p:nvPr/>
+        </p:nvPicPr>
+        <p:blipFill>
+          <a:blip r:embed="rId4">
+            <a:extLst>
+              <a:ext uri="{28A0092B-C50C-407E-A947-70E740481C1C}">
+                <a14:useLocalDpi xmlns:a14="http://schemas.microsoft.com/office/drawing/2010/main" val="0"/>
+              </a:ext>
+            </a:extLst>
+          </a:blip>
+          <a:srcRect/>
+          <a:stretch>
+            <a:fillRect/>
+          </a:stretch>
+        </p:blipFill>
+        <p:spPr bwMode="auto">
+          <a:xfrm>
+            <a:off x="1511916" y="2449105"/>
+            <a:ext cx="2844910" cy="2282953"/>
+          </a:xfrm>
+          <a:prstGeom prst="rect">
+            <a:avLst/>
+          </a:prstGeom>
+          <a:noFill/>
+          <a:extLst>
+            <a:ext uri="{909E8E84-426E-40DD-AFC4-6F175D3DCCD1}">
+              <a14:hiddenFill xmlns:a14="http://schemas.microsoft.com/office/drawing/2010/main">
+                <a:solidFill>
+                  <a:srgbClr val="FFFFFF"/>
+                </a:solidFill>
+              </a14:hiddenFill>
+            </a:ext>
+          </a:extLst>
+        </p:spPr>
+      </p:pic>
+      <p:sp>
+        <p:nvSpPr>
+          <p:cNvPr id="7" name="TextBox 6">
+            <a:extLst>
+              <a:ext uri="{FF2B5EF4-FFF2-40B4-BE49-F238E27FC236}">
+                <a16:creationId xmlns:a16="http://schemas.microsoft.com/office/drawing/2014/main" id="{6398E0B8-C691-B014-CA3A-F521690DB515}"/>
+              </a:ext>
+            </a:extLst>
+          </p:cNvPr>
+          <p:cNvSpPr txBox="1"/>
+          <p:nvPr/>
+        </p:nvSpPr>
+        <p:spPr>
+          <a:xfrm>
+            <a:off x="207264" y="3115602"/>
+            <a:ext cx="1304652" cy="646331"/>
+          </a:xfrm>
+          <a:prstGeom prst="rect">
+            <a:avLst/>
+          </a:prstGeom>
+          <a:noFill/>
+        </p:spPr>
+        <p:txBody>
+          <a:bodyPr wrap="square" rtlCol="0">
+            <a:spAutoFit/>
+          </a:bodyPr>
+          <a:lstStyle/>
+          <a:p>
+            <a:r>
+              <a:rPr lang="en-US" dirty="0"/>
+              <a:t>Timestep: 1E-7 s</a:t>
+            </a:r>
+          </a:p>
+        </p:txBody>
+      </p:sp>
+      <p:pic>
+        <p:nvPicPr>
+          <p:cNvPr id="11" name="Picture 8">
+            <a:extLst>
+              <a:ext uri="{FF2B5EF4-FFF2-40B4-BE49-F238E27FC236}">
+                <a16:creationId xmlns:a16="http://schemas.microsoft.com/office/drawing/2014/main" id="{A370B662-E4FA-C8F7-0023-109BB0DE8B52}"/>
+              </a:ext>
+            </a:extLst>
+          </p:cNvPr>
+          <p:cNvPicPr>
+            <a:picLocks noChangeAspect="1" noChangeArrowheads="1"/>
+          </p:cNvPicPr>
+          <p:nvPr/>
+        </p:nvPicPr>
+        <p:blipFill>
+          <a:blip r:embed="rId5">
+            <a:extLst>
+              <a:ext uri="{28A0092B-C50C-407E-A947-70E740481C1C}">
+                <a14:useLocalDpi xmlns:a14="http://schemas.microsoft.com/office/drawing/2010/main" val="0"/>
+              </a:ext>
+            </a:extLst>
+          </a:blip>
+          <a:srcRect/>
+          <a:stretch>
+            <a:fillRect/>
+          </a:stretch>
+        </p:blipFill>
+        <p:spPr bwMode="auto">
+          <a:xfrm>
+            <a:off x="7772157" y="94626"/>
+            <a:ext cx="2832354" cy="2272877"/>
+          </a:xfrm>
+          <a:prstGeom prst="rect">
+            <a:avLst/>
+          </a:prstGeom>
+          <a:noFill/>
+          <a:extLst>
+            <a:ext uri="{909E8E84-426E-40DD-AFC4-6F175D3DCCD1}">
+              <a14:hiddenFill xmlns:a14="http://schemas.microsoft.com/office/drawing/2010/main">
+                <a:solidFill>
+                  <a:srgbClr val="FFFFFF"/>
+                </a:solidFill>
+              </a14:hiddenFill>
+            </a:ext>
+          </a:extLst>
+        </p:spPr>
+      </p:pic>
+      <p:pic>
+        <p:nvPicPr>
+          <p:cNvPr id="1030" name="Picture 6">
+            <a:extLst>
+              <a:ext uri="{FF2B5EF4-FFF2-40B4-BE49-F238E27FC236}">
+                <a16:creationId xmlns:a16="http://schemas.microsoft.com/office/drawing/2014/main" id="{02171925-05FF-7C8B-64D0-15A055101159}"/>
+              </a:ext>
+            </a:extLst>
+          </p:cNvPr>
+          <p:cNvPicPr>
+            <a:picLocks noChangeAspect="1" noChangeArrowheads="1"/>
+          </p:cNvPicPr>
+          <p:nvPr/>
+        </p:nvPicPr>
+        <p:blipFill>
+          <a:blip r:embed="rId6">
+            <a:extLst>
+              <a:ext uri="{28A0092B-C50C-407E-A947-70E740481C1C}">
+                <a14:useLocalDpi xmlns:a14="http://schemas.microsoft.com/office/drawing/2010/main" val="0"/>
+              </a:ext>
+            </a:extLst>
+          </a:blip>
+          <a:srcRect/>
+          <a:stretch>
+            <a:fillRect/>
+          </a:stretch>
+        </p:blipFill>
+        <p:spPr bwMode="auto">
+          <a:xfrm>
+            <a:off x="4356826" y="2367503"/>
+            <a:ext cx="3036963" cy="2437069"/>
+          </a:xfrm>
+          <a:prstGeom prst="rect">
+            <a:avLst/>
+          </a:prstGeom>
+          <a:noFill/>
+          <a:extLst>
+            <a:ext uri="{909E8E84-426E-40DD-AFC4-6F175D3DCCD1}">
+              <a14:hiddenFill xmlns:a14="http://schemas.microsoft.com/office/drawing/2010/main">
+                <a:solidFill>
+                  <a:srgbClr val="FFFFFF"/>
+                </a:solidFill>
+              </a14:hiddenFill>
+            </a:ext>
+          </a:extLst>
+        </p:spPr>
+      </p:pic>
+      <p:pic>
+        <p:nvPicPr>
+          <p:cNvPr id="1032" name="Picture 8">
+            <a:extLst>
+              <a:ext uri="{FF2B5EF4-FFF2-40B4-BE49-F238E27FC236}">
+                <a16:creationId xmlns:a16="http://schemas.microsoft.com/office/drawing/2014/main" id="{501B3D5B-A87C-F03E-3340-37DBE6432EA1}"/>
+              </a:ext>
+            </a:extLst>
+          </p:cNvPr>
+          <p:cNvPicPr>
+            <a:picLocks noChangeAspect="1" noChangeArrowheads="1"/>
+          </p:cNvPicPr>
+          <p:nvPr/>
+        </p:nvPicPr>
+        <p:blipFill>
+          <a:blip r:embed="rId7">
+            <a:extLst>
+              <a:ext uri="{28A0092B-C50C-407E-A947-70E740481C1C}">
+                <a14:useLocalDpi xmlns:a14="http://schemas.microsoft.com/office/drawing/2010/main" val="0"/>
+              </a:ext>
+            </a:extLst>
+          </a:blip>
+          <a:srcRect/>
+          <a:stretch>
+            <a:fillRect/>
+          </a:stretch>
+        </p:blipFill>
+        <p:spPr bwMode="auto">
+          <a:xfrm>
+            <a:off x="7567547" y="2377578"/>
+            <a:ext cx="3036964" cy="2437069"/>
+          </a:xfrm>
+          <a:prstGeom prst="rect">
+            <a:avLst/>
+          </a:prstGeom>
+          <a:noFill/>
+          <a:extLst>
+            <a:ext uri="{909E8E84-426E-40DD-AFC4-6F175D3DCCD1}">
+              <a14:hiddenFill xmlns:a14="http://schemas.microsoft.com/office/drawing/2010/main">
+                <a:solidFill>
+                  <a:srgbClr val="FFFFFF"/>
+                </a:solidFill>
+              </a14:hiddenFill>
+            </a:ext>
+          </a:extLst>
+        </p:spPr>
+      </p:pic>
+      <p:pic>
+        <p:nvPicPr>
+          <p:cNvPr id="12" name="Picture 10">
+            <a:extLst>
+              <a:ext uri="{FF2B5EF4-FFF2-40B4-BE49-F238E27FC236}">
+                <a16:creationId xmlns:a16="http://schemas.microsoft.com/office/drawing/2014/main" id="{EC7DEA2D-F5D3-627B-F42D-D33CB38BE95A}"/>
+              </a:ext>
+            </a:extLst>
+          </p:cNvPr>
+          <p:cNvPicPr>
+            <a:picLocks noChangeAspect="1" noChangeArrowheads="1"/>
+          </p:cNvPicPr>
+          <p:nvPr/>
+        </p:nvPicPr>
+        <p:blipFill>
+          <a:blip r:embed="rId8">
+            <a:extLst>
+              <a:ext uri="{28A0092B-C50C-407E-A947-70E740481C1C}">
+                <a14:useLocalDpi xmlns:a14="http://schemas.microsoft.com/office/drawing/2010/main" val="0"/>
+              </a:ext>
+            </a:extLst>
+          </a:blip>
+          <a:srcRect/>
+          <a:stretch>
+            <a:fillRect/>
+          </a:stretch>
+        </p:blipFill>
+        <p:spPr bwMode="auto">
+          <a:xfrm>
+            <a:off x="4473850" y="65673"/>
+            <a:ext cx="2904513" cy="2330782"/>
+          </a:xfrm>
+          <a:prstGeom prst="rect">
+            <a:avLst/>
+          </a:prstGeom>
+          <a:noFill/>
+          <a:extLst>
+            <a:ext uri="{909E8E84-426E-40DD-AFC4-6F175D3DCCD1}">
+              <a14:hiddenFill xmlns:a14="http://schemas.microsoft.com/office/drawing/2010/main">
+                <a:solidFill>
+                  <a:srgbClr val="FFFFFF"/>
+                </a:solidFill>
+              </a14:hiddenFill>
+            </a:ext>
+          </a:extLst>
+        </p:spPr>
+      </p:pic>
+      <p:sp>
+        <p:nvSpPr>
+          <p:cNvPr id="13" name="TextBox 12">
+            <a:extLst>
+              <a:ext uri="{FF2B5EF4-FFF2-40B4-BE49-F238E27FC236}">
+                <a16:creationId xmlns:a16="http://schemas.microsoft.com/office/drawing/2014/main" id="{DF976396-2F68-D670-4B0E-F3C0C9030D28}"/>
+              </a:ext>
+            </a:extLst>
+          </p:cNvPr>
+          <p:cNvSpPr txBox="1"/>
+          <p:nvPr/>
+        </p:nvSpPr>
+        <p:spPr>
+          <a:xfrm>
+            <a:off x="561369" y="5229505"/>
+            <a:ext cx="7345502" cy="646331"/>
+          </a:xfrm>
+          <a:prstGeom prst="rect">
+            <a:avLst/>
+          </a:prstGeom>
+          <a:noFill/>
+        </p:spPr>
+        <p:txBody>
+          <a:bodyPr wrap="square" rtlCol="0">
+            <a:spAutoFit/>
+          </a:bodyPr>
+          <a:lstStyle/>
+          <a:p>
+            <a:r>
+              <a:rPr lang="en-US" dirty="0"/>
+              <a:t>Observations: under the basic forward time march, timestep does have an impact </a:t>
+            </a:r>
+            <a:r>
+              <a:rPr lang="en-US" dirty="0">
+                <a:sym typeface="Wingdings" pitchFamily="2" charset="2"/>
+              </a:rPr>
+              <a:t> better to use Runge-</a:t>
+            </a:r>
+            <a:r>
+              <a:rPr lang="en-US" dirty="0" err="1">
+                <a:sym typeface="Wingdings" pitchFamily="2" charset="2"/>
+              </a:rPr>
+              <a:t>Kutta</a:t>
+            </a:r>
+            <a:r>
+              <a:rPr lang="en-US" dirty="0">
+                <a:sym typeface="Wingdings" pitchFamily="2" charset="2"/>
+              </a:rPr>
+              <a:t> 4 .</a:t>
+            </a:r>
+            <a:r>
+              <a:rPr lang="en-US" dirty="0" err="1">
+                <a:sym typeface="Wingdings" pitchFamily="2" charset="2"/>
+              </a:rPr>
+              <a:t>etc</a:t>
+            </a:r>
+            <a:r>
+              <a:rPr lang="en-US" dirty="0">
+                <a:sym typeface="Wingdings" pitchFamily="2" charset="2"/>
+              </a:rPr>
+              <a:t> package</a:t>
+            </a:r>
+            <a:endParaRPr lang="en-US" dirty="0"/>
+          </a:p>
+        </p:txBody>
+      </p:sp>
+    </p:spTree>
+    <p:extLst>
+      <p:ext uri="{BB962C8B-B14F-4D97-AF65-F5344CB8AC3E}">
+        <p14:creationId xmlns:p14="http://schemas.microsoft.com/office/powerpoint/2010/main" val="2137833827"/>
+      </p:ext>
+    </p:extLst>
+  </p:cSld>
+  <p:clrMapOvr>
+    <a:masterClrMapping/>
+  </p:clrMapOvr>
+</p:sld>
+</file>
+
+<file path=ppt/slides/slide5.xml><?xml version="1.0" encoding="utf-8"?>
+<p:sld xmlns:a="http://schemas.openxmlformats.org/drawingml/2006/main" xmlns:r="http://schemas.openxmlformats.org/officeDocument/2006/relationships" xmlns:p="http://schemas.openxmlformats.org/presentationml/2006/main">
+  <p:cSld>
+    <p:spTree>
+      <p:nvGrpSpPr>
+        <p:cNvPr id="1" name=""/>
+        <p:cNvGrpSpPr/>
+        <p:nvPr/>
+      </p:nvGrpSpPr>
+      <p:grpSpPr>
+        <a:xfrm>
+          <a:off x="0" y="0"/>
+          <a:ext cx="0" cy="0"/>
+          <a:chOff x="0" y="0"/>
+          <a:chExt cx="0" cy="0"/>
+        </a:xfrm>
+      </p:grpSpPr>
+      <p:sp>
+        <p:nvSpPr>
+          <p:cNvPr id="2" name="Title 1">
+            <a:extLst>
+              <a:ext uri="{FF2B5EF4-FFF2-40B4-BE49-F238E27FC236}">
+                <a16:creationId xmlns:a16="http://schemas.microsoft.com/office/drawing/2014/main" id="{3FC564DE-28A5-60D3-FBAB-212EFD4B3A30}"/>
+              </a:ext>
+            </a:extLst>
+          </p:cNvPr>
+          <p:cNvSpPr>
+            <a:spLocks noGrp="1"/>
+          </p:cNvSpPr>
+          <p:nvPr>
+            <p:ph type="title"/>
+          </p:nvPr>
+        </p:nvSpPr>
+        <p:spPr>
+          <a:xfrm>
+            <a:off x="838200" y="109631"/>
+            <a:ext cx="10515600" cy="1325563"/>
+          </a:xfrm>
+        </p:spPr>
+        <p:txBody>
+          <a:bodyPr/>
+          <a:lstStyle/>
+          <a:p>
+            <a:r>
+              <a:rPr lang="en-US" dirty="0"/>
+              <a:t>Alignment issues</a:t>
+            </a:r>
+          </a:p>
+        </p:txBody>
+      </p:sp>
+      <p:sp>
+        <p:nvSpPr>
+          <p:cNvPr id="3" name="Content Placeholder 2">
+            <a:extLst>
+              <a:ext uri="{FF2B5EF4-FFF2-40B4-BE49-F238E27FC236}">
+                <a16:creationId xmlns:a16="http://schemas.microsoft.com/office/drawing/2014/main" id="{F45B061D-94AA-500B-D40C-CEC0515E5183}"/>
+              </a:ext>
+            </a:extLst>
+          </p:cNvPr>
+          <p:cNvSpPr>
+            <a:spLocks noGrp="1"/>
+          </p:cNvSpPr>
+          <p:nvPr>
+            <p:ph idx="1"/>
+          </p:nvPr>
+        </p:nvSpPr>
+        <p:spPr>
+          <a:xfrm>
+            <a:off x="838200" y="1210235"/>
+            <a:ext cx="10515600" cy="1465730"/>
+          </a:xfrm>
+        </p:spPr>
+        <p:txBody>
+          <a:bodyPr>
+            <a:normAutofit fontScale="92500" lnSpcReduction="20000"/>
+          </a:bodyPr>
+          <a:lstStyle/>
+          <a:p>
+            <a:r>
+              <a:rPr lang="en-US" dirty="0"/>
+              <a:t>Initial values: ground state 0.25, excited state 0.75 from density matrix (see the left most data points)</a:t>
+            </a:r>
+          </a:p>
+          <a:p>
+            <a:r>
+              <a:rPr lang="en-US" dirty="0"/>
+              <a:t>Quantum and analytical don’t match! The I should be interpreted as identity matrix in make </a:t>
+            </a:r>
+            <a:r>
+              <a:rPr lang="en-US" dirty="0" err="1"/>
+              <a:t>Lindbladian</a:t>
+            </a:r>
+            <a:r>
+              <a:rPr lang="en-US" dirty="0"/>
+              <a:t>. When I tried it as ones, </a:t>
+            </a:r>
+          </a:p>
+        </p:txBody>
+      </p:sp>
+      <p:pic>
+        <p:nvPicPr>
+          <p:cNvPr id="2050" name="Picture 2">
+            <a:extLst>
+              <a:ext uri="{FF2B5EF4-FFF2-40B4-BE49-F238E27FC236}">
+                <a16:creationId xmlns:a16="http://schemas.microsoft.com/office/drawing/2014/main" id="{1C621506-CB66-050E-DA0E-DE7E15D777DE}"/>
+              </a:ext>
+            </a:extLst>
+          </p:cNvPr>
+          <p:cNvPicPr>
+            <a:picLocks noChangeAspect="1" noChangeArrowheads="1"/>
+          </p:cNvPicPr>
+          <p:nvPr/>
+        </p:nvPicPr>
+        <p:blipFill>
+          <a:blip r:embed="rId2">
+            <a:extLst>
+              <a:ext uri="{28A0092B-C50C-407E-A947-70E740481C1C}">
+                <a14:useLocalDpi xmlns:a14="http://schemas.microsoft.com/office/drawing/2010/main" val="0"/>
+              </a:ext>
+            </a:extLst>
+          </a:blip>
+          <a:srcRect/>
+          <a:stretch>
+            <a:fillRect/>
+          </a:stretch>
+        </p:blipFill>
+        <p:spPr bwMode="auto">
+          <a:xfrm>
+            <a:off x="1567703" y="2810902"/>
+            <a:ext cx="3282763" cy="2501153"/>
+          </a:xfrm>
+          <a:prstGeom prst="rect">
+            <a:avLst/>
+          </a:prstGeom>
+          <a:noFill/>
+          <a:extLst>
+            <a:ext uri="{909E8E84-426E-40DD-AFC4-6F175D3DCCD1}">
+              <a14:hiddenFill xmlns:a14="http://schemas.microsoft.com/office/drawing/2010/main">
+                <a:solidFill>
+                  <a:srgbClr val="FFFFFF"/>
+                </a:solidFill>
+              </a14:hiddenFill>
+            </a:ext>
+          </a:extLst>
+        </p:spPr>
+      </p:pic>
+      <p:pic>
+        <p:nvPicPr>
+          <p:cNvPr id="2052" name="Picture 4">
+            <a:extLst>
+              <a:ext uri="{FF2B5EF4-FFF2-40B4-BE49-F238E27FC236}">
+                <a16:creationId xmlns:a16="http://schemas.microsoft.com/office/drawing/2014/main" id="{8B621604-B6BC-9ACA-E01D-4FE5F5CB4FBA}"/>
+              </a:ext>
+            </a:extLst>
+          </p:cNvPr>
+          <p:cNvPicPr>
+            <a:picLocks noChangeAspect="1" noChangeArrowheads="1"/>
+          </p:cNvPicPr>
+          <p:nvPr/>
+        </p:nvPicPr>
+        <p:blipFill>
+          <a:blip r:embed="rId3">
+            <a:extLst>
+              <a:ext uri="{28A0092B-C50C-407E-A947-70E740481C1C}">
+                <a14:useLocalDpi xmlns:a14="http://schemas.microsoft.com/office/drawing/2010/main" val="0"/>
+              </a:ext>
+            </a:extLst>
+          </a:blip>
+          <a:srcRect/>
+          <a:stretch>
+            <a:fillRect/>
+          </a:stretch>
+        </p:blipFill>
+        <p:spPr bwMode="auto">
+          <a:xfrm>
+            <a:off x="5567081" y="2810901"/>
+            <a:ext cx="3092825" cy="2481897"/>
+          </a:xfrm>
+          <a:prstGeom prst="rect">
+            <a:avLst/>
+          </a:prstGeom>
+          <a:noFill/>
+          <a:extLst>
+            <a:ext uri="{909E8E84-426E-40DD-AFC4-6F175D3DCCD1}">
+              <a14:hiddenFill xmlns:a14="http://schemas.microsoft.com/office/drawing/2010/main">
+                <a:solidFill>
+                  <a:srgbClr val="FFFFFF"/>
+                </a:solidFill>
+              </a14:hiddenFill>
+            </a:ext>
+          </a:extLst>
+        </p:spPr>
+      </p:pic>
+      <p:sp>
+        <p:nvSpPr>
+          <p:cNvPr id="4" name="TextBox 3">
+            <a:extLst>
+              <a:ext uri="{FF2B5EF4-FFF2-40B4-BE49-F238E27FC236}">
+                <a16:creationId xmlns:a16="http://schemas.microsoft.com/office/drawing/2014/main" id="{DA40219A-9353-6B8A-405B-E9F86F7EE880}"/>
+              </a:ext>
+            </a:extLst>
+          </p:cNvPr>
+          <p:cNvSpPr txBox="1"/>
+          <p:nvPr/>
+        </p:nvSpPr>
+        <p:spPr>
+          <a:xfrm>
+            <a:off x="1031198" y="5446992"/>
+            <a:ext cx="4355772" cy="369332"/>
+          </a:xfrm>
+          <a:prstGeom prst="rect">
+            <a:avLst/>
+          </a:prstGeom>
+          <a:noFill/>
+        </p:spPr>
+        <p:txBody>
+          <a:bodyPr wrap="square" rtlCol="0">
+            <a:spAutoFit/>
+          </a:bodyPr>
+          <a:lstStyle/>
+          <a:p>
+            <a:pPr algn="ctr"/>
+            <a:r>
+              <a:rPr lang="en-US" dirty="0"/>
+              <a:t>Delta, gamma, Omega at 1.0, 1.0, 1.0</a:t>
+            </a:r>
+          </a:p>
+        </p:txBody>
+      </p:sp>
+      <p:sp>
+        <p:nvSpPr>
+          <p:cNvPr id="5" name="TextBox 4">
+            <a:extLst>
+              <a:ext uri="{FF2B5EF4-FFF2-40B4-BE49-F238E27FC236}">
+                <a16:creationId xmlns:a16="http://schemas.microsoft.com/office/drawing/2014/main" id="{C0C7CBF0-149A-75C6-0126-2C9152CA6A8F}"/>
+              </a:ext>
+            </a:extLst>
+          </p:cNvPr>
+          <p:cNvSpPr txBox="1"/>
+          <p:nvPr/>
+        </p:nvSpPr>
+        <p:spPr>
+          <a:xfrm>
+            <a:off x="5056351" y="5400865"/>
+            <a:ext cx="4355772" cy="369332"/>
+          </a:xfrm>
+          <a:prstGeom prst="rect">
+            <a:avLst/>
+          </a:prstGeom>
+          <a:noFill/>
+        </p:spPr>
+        <p:txBody>
+          <a:bodyPr wrap="square" rtlCol="0">
+            <a:spAutoFit/>
+          </a:bodyPr>
+          <a:lstStyle/>
+          <a:p>
+            <a:pPr algn="ctr"/>
+            <a:r>
+              <a:rPr lang="en-US" dirty="0"/>
+              <a:t>Timestep at 1E-7 s</a:t>
+            </a:r>
+          </a:p>
+        </p:txBody>
+      </p:sp>
+    </p:spTree>
+    <p:extLst>
+      <p:ext uri="{BB962C8B-B14F-4D97-AF65-F5344CB8AC3E}">
+        <p14:creationId xmlns:p14="http://schemas.microsoft.com/office/powerpoint/2010/main" val="1617630014"/>
+      </p:ext>
+    </p:extLst>
+  </p:cSld>
+  <p:clrMapOvr>
+    <a:masterClrMapping/>
+  </p:clrMapOvr>
+</p:sld>
+</file>
+
+<file path=ppt/slides/slide6.xml><?xml version="1.0" encoding="utf-8"?>
+<p:sld xmlns:a="http://schemas.openxmlformats.org/drawingml/2006/main" xmlns:r="http://schemas.openxmlformats.org/officeDocument/2006/relationships" xmlns:p="http://schemas.openxmlformats.org/presentationml/2006/main">
+  <p:cSld>
+    <p:spTree>
+      <p:nvGrpSpPr>
+        <p:cNvPr id="1" name=""/>
+        <p:cNvGrpSpPr/>
+        <p:nvPr/>
+      </p:nvGrpSpPr>
+      <p:grpSpPr>
+        <a:xfrm>
+          <a:off x="0" y="0"/>
+          <a:ext cx="0" cy="0"/>
+          <a:chOff x="0" y="0"/>
+          <a:chExt cx="0" cy="0"/>
+        </a:xfrm>
+      </p:grpSpPr>
+      <p:sp>
+        <p:nvSpPr>
+          <p:cNvPr id="2" name="Title 1">
+            <a:extLst>
+              <a:ext uri="{FF2B5EF4-FFF2-40B4-BE49-F238E27FC236}">
+                <a16:creationId xmlns:a16="http://schemas.microsoft.com/office/drawing/2014/main" id="{2A8AAEBE-1A13-1637-ACE7-63C4A46D7DB9}"/>
+              </a:ext>
+            </a:extLst>
+          </p:cNvPr>
+          <p:cNvSpPr>
+            <a:spLocks noGrp="1"/>
+          </p:cNvSpPr>
+          <p:nvPr>
+            <p:ph type="title"/>
+          </p:nvPr>
+        </p:nvSpPr>
+        <p:spPr/>
+        <p:txBody>
+          <a:bodyPr/>
+          <a:lstStyle/>
+          <a:p>
+            <a:r>
+              <a:rPr lang="en-US" dirty="0" err="1"/>
+              <a:t>QuTip</a:t>
+            </a:r>
+            <a:r>
+              <a:rPr lang="en-US" dirty="0"/>
+              <a:t> installation and examples</a:t>
+            </a:r>
+          </a:p>
+        </p:txBody>
+      </p:sp>
+      <p:sp>
+        <p:nvSpPr>
+          <p:cNvPr id="3" name="Content Placeholder 2">
+            <a:extLst>
+              <a:ext uri="{FF2B5EF4-FFF2-40B4-BE49-F238E27FC236}">
+                <a16:creationId xmlns:a16="http://schemas.microsoft.com/office/drawing/2014/main" id="{3795628A-14A8-F0E2-6997-D6A9AB1B195E}"/>
+              </a:ext>
+            </a:extLst>
+          </p:cNvPr>
+          <p:cNvSpPr>
+            <a:spLocks noGrp="1"/>
+          </p:cNvSpPr>
+          <p:nvPr>
+            <p:ph idx="1"/>
+          </p:nvPr>
+        </p:nvSpPr>
+        <p:spPr/>
+        <p:txBody>
+          <a:bodyPr/>
+          <a:lstStyle/>
+          <a:p>
+            <a:r>
+              <a:rPr lang="en-US" dirty="0">
+                <a:hlinkClick r:id="rId2"/>
+              </a:rPr>
+              <a:t>https://qutip.org/docs/latest/guide/dynamics/dynamics-master.html</a:t>
+            </a:r>
+            <a:r>
+              <a:rPr lang="en-US" dirty="0"/>
+              <a:t> </a:t>
+            </a:r>
+          </a:p>
+        </p:txBody>
+      </p:sp>
+    </p:spTree>
+    <p:extLst>
+      <p:ext uri="{BB962C8B-B14F-4D97-AF65-F5344CB8AC3E}">
+        <p14:creationId xmlns:p14="http://schemas.microsoft.com/office/powerpoint/2010/main" val="2541054718"/>
       </p:ext>
     </p:extLst>
   </p:cSld>

</xml_diff>